<commit_message>
Updated product name, added permalinks
</commit_message>
<xml_diff>
--- a/docs/deployment_guide/images/vesoft-nebula-graph-architecture-diagram.pptx
+++ b/docs/deployment_guide/images/vesoft-nebula-graph-architecture-diagram.pptx
@@ -198,7 +198,7 @@
           <a:p>
             <a:fld id="{7620BAC1-F01C-4C6D-A3D6-D7175C3FCF18}" type="datetimeFigureOut">
               <a:rPr lang="zh-CN" altLang="en-US" smtClean="0"/>
-              <a:t>2022/9/9</a:t>
+              <a:t>2022/9/14</a:t>
             </a:fld>
             <a:endParaRPr lang="zh-CN" altLang="en-US"/>
           </a:p>
@@ -774,7 +774,7 @@
           <a:p>
             <a:fld id="{2A5A3939-32E0-4F99-B9F1-CDD4CE48F6DE}" type="datetimeFigureOut">
               <a:rPr lang="zh-CN" altLang="en-US" smtClean="0"/>
-              <a:t>2022/9/9</a:t>
+              <a:t>2022/9/14</a:t>
             </a:fld>
             <a:endParaRPr lang="zh-CN" altLang="en-US"/>
           </a:p>
@@ -944,7 +944,7 @@
           <a:p>
             <a:fld id="{2A5A3939-32E0-4F99-B9F1-CDD4CE48F6DE}" type="datetimeFigureOut">
               <a:rPr lang="zh-CN" altLang="en-US" smtClean="0"/>
-              <a:t>2022/9/9</a:t>
+              <a:t>2022/9/14</a:t>
             </a:fld>
             <a:endParaRPr lang="zh-CN" altLang="en-US"/>
           </a:p>
@@ -1124,7 +1124,7 @@
           <a:p>
             <a:fld id="{2A5A3939-32E0-4F99-B9F1-CDD4CE48F6DE}" type="datetimeFigureOut">
               <a:rPr lang="zh-CN" altLang="en-US" smtClean="0"/>
-              <a:t>2022/9/9</a:t>
+              <a:t>2022/9/14</a:t>
             </a:fld>
             <a:endParaRPr lang="zh-CN" altLang="en-US"/>
           </a:p>
@@ -1294,7 +1294,7 @@
           <a:p>
             <a:fld id="{2A5A3939-32E0-4F99-B9F1-CDD4CE48F6DE}" type="datetimeFigureOut">
               <a:rPr lang="zh-CN" altLang="en-US" smtClean="0"/>
-              <a:t>2022/9/9</a:t>
+              <a:t>2022/9/14</a:t>
             </a:fld>
             <a:endParaRPr lang="zh-CN" altLang="en-US"/>
           </a:p>
@@ -1538,7 +1538,7 @@
           <a:p>
             <a:fld id="{2A5A3939-32E0-4F99-B9F1-CDD4CE48F6DE}" type="datetimeFigureOut">
               <a:rPr lang="zh-CN" altLang="en-US" smtClean="0"/>
-              <a:t>2022/9/9</a:t>
+              <a:t>2022/9/14</a:t>
             </a:fld>
             <a:endParaRPr lang="zh-CN" altLang="en-US"/>
           </a:p>
@@ -1770,7 +1770,7 @@
           <a:p>
             <a:fld id="{2A5A3939-32E0-4F99-B9F1-CDD4CE48F6DE}" type="datetimeFigureOut">
               <a:rPr lang="zh-CN" altLang="en-US" smtClean="0"/>
-              <a:t>2022/9/9</a:t>
+              <a:t>2022/9/14</a:t>
             </a:fld>
             <a:endParaRPr lang="zh-CN" altLang="en-US"/>
           </a:p>
@@ -2137,7 +2137,7 @@
           <a:p>
             <a:fld id="{2A5A3939-32E0-4F99-B9F1-CDD4CE48F6DE}" type="datetimeFigureOut">
               <a:rPr lang="zh-CN" altLang="en-US" smtClean="0"/>
-              <a:t>2022/9/9</a:t>
+              <a:t>2022/9/14</a:t>
             </a:fld>
             <a:endParaRPr lang="zh-CN" altLang="en-US"/>
           </a:p>
@@ -2255,7 +2255,7 @@
           <a:p>
             <a:fld id="{2A5A3939-32E0-4F99-B9F1-CDD4CE48F6DE}" type="datetimeFigureOut">
               <a:rPr lang="zh-CN" altLang="en-US" smtClean="0"/>
-              <a:t>2022/9/9</a:t>
+              <a:t>2022/9/14</a:t>
             </a:fld>
             <a:endParaRPr lang="zh-CN" altLang="en-US"/>
           </a:p>
@@ -2350,7 +2350,7 @@
           <a:p>
             <a:fld id="{2A5A3939-32E0-4F99-B9F1-CDD4CE48F6DE}" type="datetimeFigureOut">
               <a:rPr lang="zh-CN" altLang="en-US" smtClean="0"/>
-              <a:t>2022/9/9</a:t>
+              <a:t>2022/9/14</a:t>
             </a:fld>
             <a:endParaRPr lang="zh-CN" altLang="en-US"/>
           </a:p>
@@ -2627,7 +2627,7 @@
           <a:p>
             <a:fld id="{2A5A3939-32E0-4F99-B9F1-CDD4CE48F6DE}" type="datetimeFigureOut">
               <a:rPr lang="zh-CN" altLang="en-US" smtClean="0"/>
-              <a:t>2022/9/9</a:t>
+              <a:t>2022/9/14</a:t>
             </a:fld>
             <a:endParaRPr lang="zh-CN" altLang="en-US"/>
           </a:p>
@@ -2884,7 +2884,7 @@
           <a:p>
             <a:fld id="{2A5A3939-32E0-4F99-B9F1-CDD4CE48F6DE}" type="datetimeFigureOut">
               <a:rPr lang="zh-CN" altLang="en-US" smtClean="0"/>
-              <a:t>2022/9/9</a:t>
+              <a:t>2022/9/14</a:t>
             </a:fld>
             <a:endParaRPr lang="zh-CN" altLang="en-US"/>
           </a:p>
@@ -3097,7 +3097,7 @@
           <a:p>
             <a:fld id="{2A5A3939-32E0-4F99-B9F1-CDD4CE48F6DE}" type="datetimeFigureOut">
               <a:rPr lang="zh-CN" altLang="en-US" smtClean="0"/>
-              <a:t>2022/9/9</a:t>
+              <a:t>2022/9/14</a:t>
             </a:fld>
             <a:endParaRPr lang="zh-CN" altLang="en-US"/>
           </a:p>
@@ -3734,7 +3734,7 @@
         </p:nvSpPr>
         <p:spPr bwMode="auto">
           <a:xfrm>
-            <a:off x="5788939" y="2695541"/>
+            <a:off x="5761740" y="2705768"/>
             <a:ext cx="1234766" cy="276999"/>
           </a:xfrm>
           <a:prstGeom prst="rect">
@@ -4165,7 +4165,7 @@
         </p:nvSpPr>
         <p:spPr bwMode="auto">
           <a:xfrm>
-            <a:off x="9054263" y="2683410"/>
+            <a:off x="8948554" y="2683409"/>
             <a:ext cx="1234766" cy="276999"/>
           </a:xfrm>
           <a:prstGeom prst="rect">
@@ -4422,7 +4422,7 @@
         </p:nvSpPr>
         <p:spPr bwMode="auto">
           <a:xfrm>
-            <a:off x="12062681" y="2683410"/>
+            <a:off x="12047346" y="2683409"/>
             <a:ext cx="1234766" cy="276999"/>
           </a:xfrm>
           <a:prstGeom prst="rect">
@@ -5645,7 +5645,7 @@
                 <a:ea typeface="Amazon Ember" panose="020B0603020204020204" pitchFamily="34" charset="0"/>
                 <a:cs typeface="Arial" panose="020B0604020202020204" pitchFamily="34" charset="0"/>
               </a:rPr>
-              <a:t>Graphd0</a:t>
+              <a:t>graphd0</a:t>
             </a:r>
           </a:p>
         </p:txBody>
@@ -5866,7 +5866,7 @@
                 <a:ea typeface="Amazon Ember" panose="020B0603020204020204" pitchFamily="34" charset="0"/>
                 <a:cs typeface="Arial" panose="020B0604020202020204" pitchFamily="34" charset="0"/>
               </a:rPr>
-              <a:t>Graphd1</a:t>
+              <a:t>graphd1</a:t>
             </a:r>
           </a:p>
         </p:txBody>
@@ -6087,7 +6087,7 @@
                 <a:ea typeface="Amazon Ember" panose="020B0603020204020204" pitchFamily="34" charset="0"/>
                 <a:cs typeface="Arial" panose="020B0604020202020204" pitchFamily="34" charset="0"/>
               </a:rPr>
-              <a:t>Graphd2</a:t>
+              <a:t>graphd2</a:t>
             </a:r>
           </a:p>
         </p:txBody>
@@ -6308,7 +6308,7 @@
                 <a:ea typeface="Amazon Ember" panose="020B0603020204020204" pitchFamily="34" charset="0"/>
                 <a:cs typeface="Arial" panose="020B0604020202020204" pitchFamily="34" charset="0"/>
               </a:rPr>
-              <a:t>Metad0</a:t>
+              <a:t>metad0</a:t>
             </a:r>
           </a:p>
         </p:txBody>
@@ -6529,7 +6529,7 @@
                 <a:ea typeface="Amazon Ember" panose="020B0603020204020204" pitchFamily="34" charset="0"/>
                 <a:cs typeface="Arial" panose="020B0604020202020204" pitchFamily="34" charset="0"/>
               </a:rPr>
-              <a:t>Metad1</a:t>
+              <a:t>metad1</a:t>
             </a:r>
           </a:p>
         </p:txBody>
@@ -6750,7 +6750,7 @@
                 <a:ea typeface="Amazon Ember" panose="020B0603020204020204" pitchFamily="34" charset="0"/>
                 <a:cs typeface="Arial" panose="020B0604020202020204" pitchFamily="34" charset="0"/>
               </a:rPr>
-              <a:t>Metad2</a:t>
+              <a:t>metad2</a:t>
             </a:r>
           </a:p>
         </p:txBody>
@@ -6971,7 +6971,7 @@
                 <a:ea typeface="Amazon Ember" panose="020B0603020204020204" pitchFamily="34" charset="0"/>
                 <a:cs typeface="Arial" panose="020B0604020202020204" pitchFamily="34" charset="0"/>
               </a:rPr>
-              <a:t>Storaged0</a:t>
+              <a:t>storaged0</a:t>
             </a:r>
           </a:p>
         </p:txBody>
@@ -7192,7 +7192,7 @@
                 <a:ea typeface="Amazon Ember" panose="020B0603020204020204" pitchFamily="34" charset="0"/>
                 <a:cs typeface="Arial" panose="020B0604020202020204" pitchFamily="34" charset="0"/>
               </a:rPr>
-              <a:t>Storaged3</a:t>
+              <a:t>storaged3</a:t>
             </a:r>
           </a:p>
         </p:txBody>
@@ -7413,7 +7413,7 @@
                 <a:ea typeface="Amazon Ember" panose="020B0603020204020204" pitchFamily="34" charset="0"/>
                 <a:cs typeface="Arial" panose="020B0604020202020204" pitchFamily="34" charset="0"/>
               </a:rPr>
-              <a:t>Storaged1</a:t>
+              <a:t>storaged1</a:t>
             </a:r>
           </a:p>
         </p:txBody>
@@ -7634,7 +7634,7 @@
                 <a:ea typeface="Amazon Ember" panose="020B0603020204020204" pitchFamily="34" charset="0"/>
                 <a:cs typeface="Arial" panose="020B0604020202020204" pitchFamily="34" charset="0"/>
               </a:rPr>
-              <a:t>Storaged4</a:t>
+              <a:t>storaged4</a:t>
             </a:r>
           </a:p>
         </p:txBody>
@@ -7855,7 +7855,7 @@
                 <a:ea typeface="Amazon Ember" panose="020B0603020204020204" pitchFamily="34" charset="0"/>
                 <a:cs typeface="Arial" panose="020B0604020202020204" pitchFamily="34" charset="0"/>
               </a:rPr>
-              <a:t>Storaged2</a:t>
+              <a:t>storaged2</a:t>
             </a:r>
           </a:p>
         </p:txBody>
@@ -7925,7 +7925,7 @@
                 <a:latin typeface="Arial" panose="020B0604020202020204" pitchFamily="34" charset="0"/>
                 <a:cs typeface="Arial" panose="020B0604020202020204" pitchFamily="34" charset="0"/>
               </a:rPr>
-              <a:t>Graph service</a:t>
+              <a:t>Meta Service</a:t>
             </a:r>
           </a:p>
         </p:txBody>
@@ -8894,7 +8894,7 @@
                 <a:latin typeface="Arial" panose="020B0604020202020204" pitchFamily="34" charset="0"/>
                 <a:cs typeface="Arial" panose="020B0604020202020204" pitchFamily="34" charset="0"/>
               </a:rPr>
-              <a:t>Graph service</a:t>
+              <a:t>Graph Service</a:t>
             </a:r>
           </a:p>
         </p:txBody>
@@ -8964,7 +8964,7 @@
                 <a:latin typeface="Arial" panose="020B0604020202020204" pitchFamily="34" charset="0"/>
                 <a:cs typeface="Arial" panose="020B0604020202020204" pitchFamily="34" charset="0"/>
               </a:rPr>
-              <a:t>Graph service</a:t>
+              <a:t>Storage Service</a:t>
             </a:r>
           </a:p>
         </p:txBody>

</xml_diff>